<commit_message>
Powerpoint and the report
</commit_message>
<xml_diff>
--- a/Final Project Review.pptx
+++ b/Final Project Review.pptx
@@ -1681,7 +1681,7 @@
             <a:fld id="{A4CF59B4-C22D-4B62-B3A6-9B1E50DB6F3C}" type="datetime1">
               <a:rPr lang="en-US"/>
               <a:pPr/>
-              <a:t>12/8/18</a:t>
+              <a:t>12/13/18</a:t>
             </a:fld>
             <a:endParaRPr lang="en-US"/>
           </a:p>
@@ -1833,11 +1833,11 @@
   <p:clrMapOvr>
     <a:masterClrMapping/>
   </p:clrMapOvr>
-  <mc:AlternateContent xmlns:mc="http://schemas.openxmlformats.org/markup-compatibility/2006">
-    <mc:Choice xmlns:p14="http://schemas.microsoft.com/office/powerpoint/2010/main" Requires="p14">
+  <mc:AlternateContent xmlns:mc="http://schemas.openxmlformats.org/markup-compatibility/2006" xmlns:p14="http://schemas.microsoft.com/office/powerpoint/2010/main">
+    <mc:Choice Requires="p14">
       <p:transition spd="slow" p14:dur="2000"/>
     </mc:Choice>
-    <mc:Fallback>
+    <mc:Fallback xmlns="">
       <p:transition spd="slow"/>
     </mc:Fallback>
   </mc:AlternateContent>
@@ -1944,11 +1944,11 @@
   <p:clrMapOvr>
     <a:masterClrMapping/>
   </p:clrMapOvr>
-  <mc:AlternateContent xmlns:mc="http://schemas.openxmlformats.org/markup-compatibility/2006">
-    <mc:Choice xmlns:p14="http://schemas.microsoft.com/office/powerpoint/2010/main" Requires="p14">
+  <mc:AlternateContent xmlns:mc="http://schemas.openxmlformats.org/markup-compatibility/2006" xmlns:p14="http://schemas.microsoft.com/office/powerpoint/2010/main">
+    <mc:Choice Requires="p14">
       <p:transition spd="slow" p14:dur="2000"/>
     </mc:Choice>
-    <mc:Fallback>
+    <mc:Fallback xmlns="">
       <p:transition spd="slow"/>
     </mc:Fallback>
   </mc:AlternateContent>
@@ -2065,11 +2065,11 @@
   <p:clrMapOvr>
     <a:masterClrMapping/>
   </p:clrMapOvr>
-  <mc:AlternateContent xmlns:mc="http://schemas.openxmlformats.org/markup-compatibility/2006">
-    <mc:Choice xmlns:p14="http://schemas.microsoft.com/office/powerpoint/2010/main" Requires="p14">
+  <mc:AlternateContent xmlns:mc="http://schemas.openxmlformats.org/markup-compatibility/2006" xmlns:p14="http://schemas.microsoft.com/office/powerpoint/2010/main">
+    <mc:Choice Requires="p14">
       <p:transition spd="slow" p14:dur="2000"/>
     </mc:Choice>
-    <mc:Fallback>
+    <mc:Fallback xmlns="">
       <p:transition spd="slow"/>
     </mc:Fallback>
   </mc:AlternateContent>
@@ -2183,11 +2183,11 @@
   <p:clrMapOvr>
     <a:masterClrMapping/>
   </p:clrMapOvr>
-  <mc:AlternateContent xmlns:mc="http://schemas.openxmlformats.org/markup-compatibility/2006">
-    <mc:Choice xmlns:p14="http://schemas.microsoft.com/office/powerpoint/2010/main" Requires="p14">
+  <mc:AlternateContent xmlns:mc="http://schemas.openxmlformats.org/markup-compatibility/2006" xmlns:p14="http://schemas.microsoft.com/office/powerpoint/2010/main">
+    <mc:Choice Requires="p14">
       <p:transition spd="slow" p14:dur="2000"/>
     </mc:Choice>
-    <mc:Fallback>
+    <mc:Fallback xmlns="">
       <p:transition spd="slow"/>
     </mc:Fallback>
   </mc:AlternateContent>
@@ -2317,11 +2317,11 @@
   <p:clrMapOvr>
     <a:masterClrMapping/>
   </p:clrMapOvr>
-  <mc:AlternateContent xmlns:mc="http://schemas.openxmlformats.org/markup-compatibility/2006">
-    <mc:Choice xmlns:p14="http://schemas.microsoft.com/office/powerpoint/2010/main" Requires="p14">
+  <mc:AlternateContent xmlns:mc="http://schemas.openxmlformats.org/markup-compatibility/2006" xmlns:p14="http://schemas.microsoft.com/office/powerpoint/2010/main">
+    <mc:Choice Requires="p14">
       <p:transition spd="slow" p14:dur="2000"/>
     </mc:Choice>
-    <mc:Fallback>
+    <mc:Fallback xmlns="">
       <p:transition spd="slow"/>
     </mc:Fallback>
   </mc:AlternateContent>
@@ -2545,11 +2545,11 @@
   <p:clrMapOvr>
     <a:masterClrMapping/>
   </p:clrMapOvr>
-  <mc:AlternateContent xmlns:mc="http://schemas.openxmlformats.org/markup-compatibility/2006">
-    <mc:Choice xmlns:p14="http://schemas.microsoft.com/office/powerpoint/2010/main" Requires="p14">
+  <mc:AlternateContent xmlns:mc="http://schemas.openxmlformats.org/markup-compatibility/2006" xmlns:p14="http://schemas.microsoft.com/office/powerpoint/2010/main">
+    <mc:Choice Requires="p14">
       <p:transition spd="slow" p14:dur="2000"/>
     </mc:Choice>
-    <mc:Fallback>
+    <mc:Fallback xmlns="">
       <p:transition spd="slow"/>
     </mc:Fallback>
   </mc:AlternateContent>
@@ -2912,11 +2912,11 @@
   <p:clrMapOvr>
     <a:masterClrMapping/>
   </p:clrMapOvr>
-  <mc:AlternateContent xmlns:mc="http://schemas.openxmlformats.org/markup-compatibility/2006">
-    <mc:Choice xmlns:p14="http://schemas.microsoft.com/office/powerpoint/2010/main" Requires="p14">
+  <mc:AlternateContent xmlns:mc="http://schemas.openxmlformats.org/markup-compatibility/2006" xmlns:p14="http://schemas.microsoft.com/office/powerpoint/2010/main">
+    <mc:Choice Requires="p14">
       <p:transition spd="slow" p14:dur="2000"/>
     </mc:Choice>
-    <mc:Fallback>
+    <mc:Fallback xmlns="">
       <p:transition spd="slow"/>
     </mc:Fallback>
   </mc:AlternateContent>
@@ -2972,11 +2972,11 @@
   <p:clrMapOvr>
     <a:masterClrMapping/>
   </p:clrMapOvr>
-  <mc:AlternateContent xmlns:mc="http://schemas.openxmlformats.org/markup-compatibility/2006">
-    <mc:Choice xmlns:p14="http://schemas.microsoft.com/office/powerpoint/2010/main" Requires="p14">
+  <mc:AlternateContent xmlns:mc="http://schemas.openxmlformats.org/markup-compatibility/2006" xmlns:p14="http://schemas.microsoft.com/office/powerpoint/2010/main">
+    <mc:Choice Requires="p14">
       <p:transition spd="slow" p14:dur="2000"/>
     </mc:Choice>
-    <mc:Fallback>
+    <mc:Fallback xmlns="">
       <p:transition spd="slow"/>
     </mc:Fallback>
   </mc:AlternateContent>
@@ -3010,11 +3010,11 @@
   <p:clrMapOvr>
     <a:masterClrMapping/>
   </p:clrMapOvr>
-  <mc:AlternateContent xmlns:mc="http://schemas.openxmlformats.org/markup-compatibility/2006">
-    <mc:Choice xmlns:p14="http://schemas.microsoft.com/office/powerpoint/2010/main" Requires="p14">
+  <mc:AlternateContent xmlns:mc="http://schemas.openxmlformats.org/markup-compatibility/2006" xmlns:p14="http://schemas.microsoft.com/office/powerpoint/2010/main">
+    <mc:Choice Requires="p14">
       <p:transition spd="slow" p14:dur="2000"/>
     </mc:Choice>
-    <mc:Fallback>
+    <mc:Fallback xmlns="">
       <p:transition spd="slow"/>
     </mc:Fallback>
   </mc:AlternateContent>
@@ -3228,11 +3228,11 @@
   <p:clrMapOvr>
     <a:masterClrMapping/>
   </p:clrMapOvr>
-  <mc:AlternateContent xmlns:mc="http://schemas.openxmlformats.org/markup-compatibility/2006">
-    <mc:Choice xmlns:p14="http://schemas.microsoft.com/office/powerpoint/2010/main" Requires="p14">
+  <mc:AlternateContent xmlns:mc="http://schemas.openxmlformats.org/markup-compatibility/2006" xmlns:p14="http://schemas.microsoft.com/office/powerpoint/2010/main">
+    <mc:Choice Requires="p14">
       <p:transition spd="slow" p14:dur="2000"/>
     </mc:Choice>
-    <mc:Fallback>
+    <mc:Fallback xmlns="">
       <p:transition spd="slow"/>
     </mc:Fallback>
   </mc:AlternateContent>
@@ -3423,11 +3423,11 @@
   <p:clrMapOvr>
     <a:masterClrMapping/>
   </p:clrMapOvr>
-  <mc:AlternateContent xmlns:mc="http://schemas.openxmlformats.org/markup-compatibility/2006">
-    <mc:Choice xmlns:p14="http://schemas.microsoft.com/office/powerpoint/2010/main" Requires="p14">
+  <mc:AlternateContent xmlns:mc="http://schemas.openxmlformats.org/markup-compatibility/2006" xmlns:p14="http://schemas.microsoft.com/office/powerpoint/2010/main">
+    <mc:Choice Requires="p14">
       <p:transition spd="slow" p14:dur="2000"/>
     </mc:Choice>
-    <mc:Fallback>
+    <mc:Fallback xmlns="">
       <p:transition spd="slow"/>
     </mc:Fallback>
   </mc:AlternateContent>
@@ -4049,11 +4049,11 @@
     <p:sldLayoutId id="2147483671" r:id="rId10"/>
     <p:sldLayoutId id="2147483672" r:id="rId11"/>
   </p:sldLayoutIdLst>
-  <mc:AlternateContent xmlns:mc="http://schemas.openxmlformats.org/markup-compatibility/2006">
-    <mc:Choice xmlns:p14="http://schemas.microsoft.com/office/powerpoint/2010/main" Requires="p14">
+  <mc:AlternateContent xmlns:mc="http://schemas.openxmlformats.org/markup-compatibility/2006" xmlns:p14="http://schemas.microsoft.com/office/powerpoint/2010/main">
+    <mc:Choice Requires="p14">
       <p:transition spd="slow" p14:dur="2000"/>
     </mc:Choice>
-    <mc:Fallback>
+    <mc:Fallback xmlns="">
       <p:transition spd="slow"/>
     </mc:Fallback>
   </mc:AlternateContent>
@@ -4908,7 +4908,7 @@
           <p:cNvPr id="2" name="TextBox 1">
             <a:extLst>
               <a:ext uri="{FF2B5EF4-FFF2-40B4-BE49-F238E27FC236}">
-                <a16:creationId xmlns:a16="http://schemas.microsoft.com/office/drawing/2014/main" xmlns="" id="{BAD8E337-376B-40F0-BCF8-6039FC28B1B8}"/>
+                <a16:creationId xmlns="" xmlns:a16="http://schemas.microsoft.com/office/drawing/2014/main" id="{BAD8E337-376B-40F0-BCF8-6039FC28B1B8}"/>
               </a:ext>
             </a:extLst>
           </p:cNvPr>
@@ -4946,15 +4946,7 @@
                   <a:srgbClr val="0070C0"/>
                 </a:solidFill>
               </a:rPr>
-              <a:t>name</a:t>
-            </a:r>
-            <a:r>
-              <a:rPr lang="en-US" dirty="0" smtClean="0">
-                <a:solidFill>
-                  <a:srgbClr val="0070C0"/>
-                </a:solidFill>
-              </a:rPr>
-              <a:t>: </a:t>
+              <a:t>name: </a:t>
             </a:r>
           </a:p>
           <a:p>
@@ -5029,11 +5021,11 @@
   <p:clrMapOvr>
     <a:masterClrMapping/>
   </p:clrMapOvr>
-  <mc:AlternateContent xmlns:mc="http://schemas.openxmlformats.org/markup-compatibility/2006">
-    <mc:Choice xmlns:p14="http://schemas.microsoft.com/office/powerpoint/2010/main" Requires="p14">
+  <mc:AlternateContent xmlns:mc="http://schemas.openxmlformats.org/markup-compatibility/2006" xmlns:p14="http://schemas.microsoft.com/office/powerpoint/2010/main">
+    <mc:Choice Requires="p14">
       <p:transition spd="slow" p14:dur="2000"/>
     </mc:Choice>
-    <mc:Fallback>
+    <mc:Fallback xmlns="">
       <p:transition spd="slow"/>
     </mc:Fallback>
   </mc:AlternateContent>
@@ -5088,7 +5080,6 @@
               <a:rPr lang="en-US" dirty="0"/>
               <a:t>Advanced design in USRP project</a:t>
             </a:r>
-            <a:endParaRPr lang="en-US" dirty="0"/>
           </a:p>
         </p:txBody>
       </p:sp>
@@ -5156,8 +5147,8 @@
           </a:extLst>
         </p:spPr>
       </p:pic>
-      <mc:AlternateContent xmlns:mc="http://schemas.openxmlformats.org/markup-compatibility/2006">
-        <mc:Choice xmlns:a14="http://schemas.microsoft.com/office/drawing/2010/main" Requires="a14">
+      <mc:AlternateContent xmlns:mc="http://schemas.openxmlformats.org/markup-compatibility/2006" xmlns:a14="http://schemas.microsoft.com/office/drawing/2010/main">
+        <mc:Choice Requires="a14">
           <p:sp>
             <p:nvSpPr>
               <p:cNvPr id="6" name="Rectangle 5"/>
@@ -5187,11 +5178,7 @@
               <a:p>
                 <a:r>
                   <a:rPr lang="en-US" sz="1400" dirty="0" smtClean="0"/>
-                  <a:t>Map </a:t>
-                </a:r>
-                <a:r>
-                  <a:rPr lang="en-US" sz="1400" dirty="0" smtClean="0"/>
-                  <a:t>the symbols to bits</a:t>
+                  <a:t>Map the symbols to bits</a:t>
                 </a:r>
               </a:p>
               <a:p>
@@ -5203,11 +5190,7 @@
               <a:p>
                 <a:r>
                   <a:rPr lang="en-US" sz="1400" dirty="0" smtClean="0"/>
-                  <a:t>Applies 4-QAM Mod</a:t>
-                </a:r>
-                <a:r>
-                  <a:rPr lang="en-US" sz="1400" dirty="0" smtClean="0"/>
-                  <a:t>.</a:t>
+                  <a:t>Applies 4-QAM Mod.</a:t>
                 </a:r>
               </a:p>
               <a:p>
@@ -5215,7 +5198,6 @@
                   <a:rPr lang="en-US" sz="1400" dirty="0" smtClean="0"/>
                   <a:t>Applies filter</a:t>
                 </a:r>
-                <a:endParaRPr lang="en-US" sz="1400" dirty="0" smtClean="0"/>
               </a:p>
               <a:p>
                 <a:r>
@@ -5279,7 +5261,7 @@
             </p:txBody>
           </p:sp>
         </mc:Choice>
-        <mc:Fallback>
+        <mc:Fallback xmlns="">
           <p:sp>
             <p:nvSpPr>
               <p:cNvPr id="6" name="Rectangle 5"/>
@@ -5318,8 +5300,8 @@
           </p:sp>
         </mc:Fallback>
       </mc:AlternateContent>
-      <mc:AlternateContent xmlns:mc="http://schemas.openxmlformats.org/markup-compatibility/2006">
-        <mc:Choice xmlns:a14="http://schemas.microsoft.com/office/drawing/2010/main" Requires="a14">
+      <mc:AlternateContent xmlns:mc="http://schemas.openxmlformats.org/markup-compatibility/2006" xmlns:a14="http://schemas.microsoft.com/office/drawing/2010/main">
+        <mc:Choice Requires="a14">
           <p:sp>
             <p:nvSpPr>
               <p:cNvPr id="7" name="Rectangle 6"/>
@@ -5404,7 +5386,6 @@
                   <a:rPr lang="en-US" sz="1400" dirty="0" smtClean="0"/>
                   <a:t>Applies Timing Recovery</a:t>
                 </a:r>
-                <a:endParaRPr lang="en-US" sz="1400" dirty="0" smtClean="0"/>
               </a:p>
               <a:p>
                 <a:r>
@@ -5476,7 +5457,7 @@
             </p:txBody>
           </p:sp>
         </mc:Choice>
-        <mc:Fallback>
+        <mc:Fallback xmlns="">
           <p:sp>
             <p:nvSpPr>
               <p:cNvPr id="7" name="Rectangle 6"/>
@@ -5598,11 +5579,11 @@
   <p:clrMapOvr>
     <a:masterClrMapping/>
   </p:clrMapOvr>
-  <mc:AlternateContent xmlns:mc="http://schemas.openxmlformats.org/markup-compatibility/2006">
-    <mc:Choice xmlns:p14="http://schemas.microsoft.com/office/powerpoint/2010/main" Requires="p14">
+  <mc:AlternateContent xmlns:mc="http://schemas.openxmlformats.org/markup-compatibility/2006" xmlns:p14="http://schemas.microsoft.com/office/powerpoint/2010/main">
+    <mc:Choice Requires="p14">
       <p:transition spd="slow" p14:dur="2000"/>
     </mc:Choice>
-    <mc:Fallback>
+    <mc:Fallback xmlns="">
       <p:transition spd="slow"/>
     </mc:Fallback>
   </mc:AlternateContent>
@@ -5638,7 +5619,7 @@
           <p:cNvPr id="2" name="Title 1">
             <a:extLst>
               <a:ext uri="{FF2B5EF4-FFF2-40B4-BE49-F238E27FC236}">
-                <a16:creationId xmlns:a16="http://schemas.microsoft.com/office/drawing/2014/main" xmlns="" id="{68DA8020-99A4-463C-8C97-D51395EDEFD5}"/>
+                <a16:creationId xmlns="" xmlns:a16="http://schemas.microsoft.com/office/drawing/2014/main" id="{68DA8020-99A4-463C-8C97-D51395EDEFD5}"/>
               </a:ext>
             </a:extLst>
           </p:cNvPr>
@@ -5683,7 +5664,7 @@
               <p:cNvPr id="3" name="Content Placeholder 2">
                 <a:extLst>
                   <a:ext uri="{FF2B5EF4-FFF2-40B4-BE49-F238E27FC236}">
-                    <a16:creationId xmlns:a16="http://schemas.microsoft.com/office/drawing/2014/main" xmlns="" id="{146C8AE3-5F9D-4A50-90E5-86A1696DC78E}"/>
+                    <a16:creationId xmlns="" xmlns:a16="http://schemas.microsoft.com/office/drawing/2014/main" id="{146C8AE3-5F9D-4A50-90E5-86A1696DC78E}"/>
                   </a:ext>
                 </a:extLst>
               </p:cNvPr>
@@ -5953,11 +5934,11 @@
   <p:clrMapOvr>
     <a:masterClrMapping/>
   </p:clrMapOvr>
-  <mc:AlternateContent xmlns:mc="http://schemas.openxmlformats.org/markup-compatibility/2006">
-    <mc:Choice xmlns:p14="http://schemas.microsoft.com/office/powerpoint/2010/main" Requires="p14">
+  <mc:AlternateContent xmlns:mc="http://schemas.openxmlformats.org/markup-compatibility/2006" xmlns:p14="http://schemas.microsoft.com/office/powerpoint/2010/main">
+    <mc:Choice Requires="p14">
       <p:transition spd="slow" p14:dur="2000"/>
     </mc:Choice>
-    <mc:Fallback>
+    <mc:Fallback xmlns="">
       <p:transition spd="slow"/>
     </mc:Fallback>
   </mc:AlternateContent>
@@ -5993,7 +5974,7 @@
           <p:cNvPr id="2" name="Title 1">
             <a:extLst>
               <a:ext uri="{FF2B5EF4-FFF2-40B4-BE49-F238E27FC236}">
-                <a16:creationId xmlns="" xmlns:a16="http://schemas.microsoft.com/office/drawing/2014/main" id="{F3E5901B-5854-4AFF-A199-0918CFB41A0A}"/>
+                <a16:creationId xmlns:a16="http://schemas.microsoft.com/office/drawing/2014/main" xmlns="" id="{F3E5901B-5854-4AFF-A199-0918CFB41A0A}"/>
               </a:ext>
             </a:extLst>
           </p:cNvPr>
@@ -6022,7 +6003,7 @@
           <p:cNvPr id="3" name="Content Placeholder 2">
             <a:extLst>
               <a:ext uri="{FF2B5EF4-FFF2-40B4-BE49-F238E27FC236}">
-                <a16:creationId xmlns="" xmlns:a16="http://schemas.microsoft.com/office/drawing/2014/main" id="{39EED756-37A5-4FB5-B271-BB7C39F2B5A0}"/>
+                <a16:creationId xmlns:a16="http://schemas.microsoft.com/office/drawing/2014/main" xmlns="" id="{39EED756-37A5-4FB5-B271-BB7C39F2B5A0}"/>
               </a:ext>
             </a:extLst>
           </p:cNvPr>
@@ -6208,11 +6189,11 @@
   <p:clrMapOvr>
     <a:masterClrMapping/>
   </p:clrMapOvr>
-  <mc:AlternateContent xmlns:mc="http://schemas.openxmlformats.org/markup-compatibility/2006">
-    <mc:Choice xmlns:p14="http://schemas.microsoft.com/office/powerpoint/2010/main" Requires="p14">
+  <mc:AlternateContent xmlns:mc="http://schemas.openxmlformats.org/markup-compatibility/2006" xmlns:p14="http://schemas.microsoft.com/office/powerpoint/2010/main">
+    <mc:Choice Requires="p14">
       <p:transition spd="slow" p14:dur="2000"/>
     </mc:Choice>
-    <mc:Fallback>
+    <mc:Fallback xmlns="">
       <p:transition spd="slow"/>
     </mc:Fallback>
   </mc:AlternateContent>
@@ -6341,8 +6322,8 @@
           </a:extLst>
         </p:spPr>
       </p:pic>
-      <mc:AlternateContent xmlns:mc="http://schemas.openxmlformats.org/markup-compatibility/2006">
-        <mc:Choice xmlns:a14="http://schemas.microsoft.com/office/drawing/2010/main" Requires="a14">
+      <mc:AlternateContent xmlns:mc="http://schemas.openxmlformats.org/markup-compatibility/2006" xmlns:a14="http://schemas.microsoft.com/office/drawing/2010/main">
+        <mc:Choice Requires="a14">
           <p:sp>
             <p:nvSpPr>
               <p:cNvPr id="6" name="Rectangle 5"/>
@@ -6372,11 +6353,7 @@
               <a:p>
                 <a:r>
                   <a:rPr lang="en-US" sz="1400" dirty="0" smtClean="0"/>
-                  <a:t>Map </a:t>
-                </a:r>
-                <a:r>
-                  <a:rPr lang="en-US" sz="1400" dirty="0" smtClean="0"/>
-                  <a:t>the symbols to bits</a:t>
+                  <a:t>Map the symbols to bits</a:t>
                 </a:r>
               </a:p>
               <a:p>
@@ -6388,11 +6365,7 @@
               <a:p>
                 <a:r>
                   <a:rPr lang="en-US" sz="1400" dirty="0" smtClean="0"/>
-                  <a:t>Applies 4-QAM Mod</a:t>
-                </a:r>
-                <a:r>
-                  <a:rPr lang="en-US" sz="1400" dirty="0" smtClean="0"/>
-                  <a:t>.</a:t>
+                  <a:t>Applies 4-QAM Mod.</a:t>
                 </a:r>
               </a:p>
               <a:p>
@@ -6400,7 +6373,6 @@
                   <a:rPr lang="en-US" sz="1400" dirty="0" smtClean="0"/>
                   <a:t>Applies filter</a:t>
                 </a:r>
-                <a:endParaRPr lang="en-US" sz="1400" dirty="0" smtClean="0"/>
               </a:p>
               <a:p>
                 <a:r>
@@ -6464,7 +6436,7 @@
             </p:txBody>
           </p:sp>
         </mc:Choice>
-        <mc:Fallback>
+        <mc:Fallback xmlns="">
           <p:sp>
             <p:nvSpPr>
               <p:cNvPr id="6" name="Rectangle 5"/>
@@ -6503,8 +6475,8 @@
           </p:sp>
         </mc:Fallback>
       </mc:AlternateContent>
-      <mc:AlternateContent xmlns:mc="http://schemas.openxmlformats.org/markup-compatibility/2006">
-        <mc:Choice xmlns:a14="http://schemas.microsoft.com/office/drawing/2010/main" Requires="a14">
+      <mc:AlternateContent xmlns:mc="http://schemas.openxmlformats.org/markup-compatibility/2006" xmlns:a14="http://schemas.microsoft.com/office/drawing/2010/main">
+        <mc:Choice Requires="a14">
           <p:sp>
             <p:nvSpPr>
               <p:cNvPr id="7" name="Rectangle 6"/>
@@ -6589,7 +6561,6 @@
                   <a:rPr lang="en-US" sz="1400" dirty="0" smtClean="0"/>
                   <a:t>Applies Timing Recovery</a:t>
                 </a:r>
-                <a:endParaRPr lang="en-US" sz="1400" dirty="0" smtClean="0"/>
               </a:p>
               <a:p>
                 <a:r>
@@ -6661,7 +6632,7 @@
             </p:txBody>
           </p:sp>
         </mc:Choice>
-        <mc:Fallback>
+        <mc:Fallback xmlns="">
           <p:sp>
             <p:nvSpPr>
               <p:cNvPr id="7" name="Rectangle 6"/>
@@ -6700,8 +6671,8 @@
           </p:sp>
         </mc:Fallback>
       </mc:AlternateContent>
-      <mc:AlternateContent xmlns:mc="http://schemas.openxmlformats.org/markup-compatibility/2006">
-        <mc:Choice xmlns:a14="http://schemas.microsoft.com/office/drawing/2010/main" Requires="a14">
+      <mc:AlternateContent xmlns:mc="http://schemas.openxmlformats.org/markup-compatibility/2006" xmlns:a14="http://schemas.microsoft.com/office/drawing/2010/main">
+        <mc:Choice Requires="a14">
           <p:sp>
             <p:nvSpPr>
               <p:cNvPr id="8" name="Rectangle 7"/>
@@ -6862,7 +6833,7 @@
             </p:txBody>
           </p:sp>
         </mc:Choice>
-        <mc:Fallback>
+        <mc:Fallback xmlns="">
           <p:sp>
             <p:nvSpPr>
               <p:cNvPr id="8" name="Rectangle 7"/>
@@ -6911,11 +6882,11 @@
   <p:clrMapOvr>
     <a:masterClrMapping/>
   </p:clrMapOvr>
-  <mc:AlternateContent xmlns:mc="http://schemas.openxmlformats.org/markup-compatibility/2006">
-    <mc:Choice xmlns:p14="http://schemas.microsoft.com/office/powerpoint/2010/main" Requires="p14">
+  <mc:AlternateContent xmlns:mc="http://schemas.openxmlformats.org/markup-compatibility/2006" xmlns:p14="http://schemas.microsoft.com/office/powerpoint/2010/main">
+    <mc:Choice Requires="p14">
       <p:transition spd="slow" p14:dur="2000"/>
     </mc:Choice>
-    <mc:Fallback>
+    <mc:Fallback xmlns="">
       <p:transition spd="slow"/>
     </mc:Fallback>
   </mc:AlternateContent>
@@ -6974,8 +6945,8 @@
           </a:p>
         </p:txBody>
       </p:sp>
-      <mc:AlternateContent xmlns:mc="http://schemas.openxmlformats.org/markup-compatibility/2006">
-        <mc:Choice xmlns:a14="http://schemas.microsoft.com/office/drawing/2010/main" Requires="a14">
+      <mc:AlternateContent xmlns:mc="http://schemas.openxmlformats.org/markup-compatibility/2006" xmlns:a14="http://schemas.microsoft.com/office/drawing/2010/main">
+        <mc:Choice Requires="a14">
           <p:sp>
             <p:nvSpPr>
               <p:cNvPr id="6" name="Rectangle 5"/>
@@ -6997,6 +6968,7 @@
               </a:bodyPr>
               <a:lstStyle/>
               <a:p>
+                <a:pPr/>
                 <a14:m>
                   <m:oMathPara xmlns:m="http://schemas.openxmlformats.org/officeDocument/2006/math">
                     <m:oMathParaPr>
@@ -7046,6 +7018,7 @@
                 <a:endParaRPr lang="en-US" sz="1800" b="0" dirty="0" smtClean="0"/>
               </a:p>
               <a:p>
+                <a:pPr/>
                 <a14:m>
                   <m:oMathPara xmlns:m="http://schemas.openxmlformats.org/officeDocument/2006/math">
                     <m:oMathParaPr>
@@ -7104,6 +7077,7 @@
                 <a:endParaRPr lang="en-US" sz="1800" dirty="0" smtClean="0"/>
               </a:p>
               <a:p>
+                <a:pPr/>
                 <a14:m>
                   <m:oMathPara xmlns:m="http://schemas.openxmlformats.org/officeDocument/2006/math">
                     <m:oMathParaPr>
@@ -7159,6 +7133,7 @@
                 <a:endParaRPr lang="en-US" sz="1800" dirty="0" smtClean="0"/>
               </a:p>
               <a:p>
+                <a:pPr/>
                 <a14:m>
                   <m:oMathPara xmlns:m="http://schemas.openxmlformats.org/officeDocument/2006/math">
                     <m:oMathParaPr>
@@ -7217,6 +7192,7 @@
                 <a:endParaRPr lang="en-US" sz="1800" dirty="0" smtClean="0"/>
               </a:p>
               <a:p>
+                <a:pPr/>
                 <a14:m>
                   <m:oMathPara xmlns:m="http://schemas.openxmlformats.org/officeDocument/2006/math">
                     <m:oMathParaPr>
@@ -7274,6 +7250,7 @@
                 <a:endParaRPr lang="en-US" sz="1800" dirty="0" smtClean="0"/>
               </a:p>
               <a:p>
+                <a:pPr/>
                 <a14:m>
                   <m:oMathPara xmlns:m="http://schemas.openxmlformats.org/officeDocument/2006/math">
                     <m:oMathParaPr>
@@ -7402,7 +7379,6 @@
                 <a:endParaRPr lang="en-US" sz="1800" dirty="0" smtClean="0"/>
               </a:p>
               <a:p>
-                <a:pPr/>
                 <a:endParaRPr lang="en-US" sz="1800" dirty="0"/>
               </a:p>
               <a:p>
@@ -7435,13 +7411,7 @@
                         <a:rPr lang="en-US" sz="1800" i="1">
                           <a:latin typeface="Cambria Math" charset="0"/>
                         </a:rPr>
-                        <m:t>=</m:t>
-                      </m:r>
-                      <m:r>
-                        <a:rPr lang="en-US" sz="1800" i="1">
-                          <a:latin typeface="Cambria Math" charset="0"/>
-                        </a:rPr>
-                        <m:t>800</m:t>
+                        <m:t>=800</m:t>
                       </m:r>
                       <m:r>
                         <a:rPr lang="en-US" sz="1800" i="1">
@@ -7590,7 +7560,7 @@
             </p:txBody>
           </p:sp>
         </mc:Choice>
-        <mc:Fallback>
+        <mc:Fallback xmlns="">
           <p:sp>
             <p:nvSpPr>
               <p:cNvPr id="6" name="Rectangle 5"/>
@@ -7751,11 +7721,11 @@
   <p:clrMapOvr>
     <a:masterClrMapping/>
   </p:clrMapOvr>
-  <mc:AlternateContent xmlns:mc="http://schemas.openxmlformats.org/markup-compatibility/2006">
-    <mc:Choice xmlns:p14="http://schemas.microsoft.com/office/powerpoint/2010/main" Requires="p14">
+  <mc:AlternateContent xmlns:mc="http://schemas.openxmlformats.org/markup-compatibility/2006" xmlns:p14="http://schemas.microsoft.com/office/powerpoint/2010/main">
+    <mc:Choice Requires="p14">
       <p:transition spd="slow" p14:dur="2000"/>
     </mc:Choice>
-    <mc:Fallback>
+    <mc:Fallback xmlns="">
       <p:transition spd="slow"/>
     </mc:Fallback>
   </mc:AlternateContent>
@@ -7791,7 +7761,7 @@
           <p:cNvPr id="2" name="Title 1">
             <a:extLst>
               <a:ext uri="{FF2B5EF4-FFF2-40B4-BE49-F238E27FC236}">
-                <a16:creationId xmlns:a16="http://schemas.microsoft.com/office/drawing/2014/main" xmlns="" id="{68DA8020-99A4-463C-8C97-D51395EDEFD5}"/>
+                <a16:creationId xmlns="" xmlns:a16="http://schemas.microsoft.com/office/drawing/2014/main" id="{68DA8020-99A4-463C-8C97-D51395EDEFD5}"/>
               </a:ext>
             </a:extLst>
           </p:cNvPr>
@@ -8305,8 +8275,8 @@
           </a:p>
         </p:txBody>
       </p:sp>
-      <mc:AlternateContent xmlns:mc="http://schemas.openxmlformats.org/markup-compatibility/2006">
-        <mc:Choice xmlns:a14="http://schemas.microsoft.com/office/drawing/2010/main" Requires="a14">
+      <mc:AlternateContent xmlns:mc="http://schemas.openxmlformats.org/markup-compatibility/2006" xmlns:a14="http://schemas.microsoft.com/office/drawing/2010/main">
+        <mc:Choice Requires="a14">
           <p:sp>
             <p:nvSpPr>
               <p:cNvPr id="17" name="Rectangle 16"/>
@@ -8553,7 +8523,7 @@
             </p:txBody>
           </p:sp>
         </mc:Choice>
-        <mc:Fallback>
+        <mc:Fallback xmlns="">
           <p:sp>
             <p:nvSpPr>
               <p:cNvPr id="17" name="Rectangle 16"/>
@@ -8632,11 +8602,11 @@
   <p:clrMapOvr>
     <a:masterClrMapping/>
   </p:clrMapOvr>
-  <mc:AlternateContent xmlns:mc="http://schemas.openxmlformats.org/markup-compatibility/2006">
-    <mc:Choice xmlns:p14="http://schemas.microsoft.com/office/powerpoint/2010/main" Requires="p14">
+  <mc:AlternateContent xmlns:mc="http://schemas.openxmlformats.org/markup-compatibility/2006" xmlns:p14="http://schemas.microsoft.com/office/powerpoint/2010/main">
+    <mc:Choice Requires="p14">
       <p:transition spd="slow" p14:dur="2000"/>
     </mc:Choice>
-    <mc:Fallback>
+    <mc:Fallback xmlns="">
       <p:transition spd="slow"/>
     </mc:Fallback>
   </mc:AlternateContent>
@@ -8709,11 +8679,11 @@
   <p:clrMapOvr>
     <a:masterClrMapping/>
   </p:clrMapOvr>
-  <mc:AlternateContent xmlns:mc="http://schemas.openxmlformats.org/markup-compatibility/2006">
-    <mc:Choice xmlns:p14="http://schemas.microsoft.com/office/powerpoint/2010/main" Requires="p14">
+  <mc:AlternateContent xmlns:mc="http://schemas.openxmlformats.org/markup-compatibility/2006" xmlns:p14="http://schemas.microsoft.com/office/powerpoint/2010/main">
+    <mc:Choice Requires="p14">
       <p:transition spd="slow" p14:dur="2000"/>
     </mc:Choice>
-    <mc:Fallback>
+    <mc:Fallback xmlns="">
       <p:transition spd="slow"/>
     </mc:Fallback>
   </mc:AlternateContent>
@@ -8749,7 +8719,7 @@
           <p:cNvPr id="2" name="Title 1">
             <a:extLst>
               <a:ext uri="{FF2B5EF4-FFF2-40B4-BE49-F238E27FC236}">
-                <a16:creationId xmlns:a16="http://schemas.microsoft.com/office/drawing/2014/main" xmlns="" id="{F3E5901B-5854-4AFF-A199-0918CFB41A0A}"/>
+                <a16:creationId xmlns="" xmlns:a16="http://schemas.microsoft.com/office/drawing/2014/main" id="{F3E5901B-5854-4AFF-A199-0918CFB41A0A}"/>
               </a:ext>
             </a:extLst>
           </p:cNvPr>
@@ -8782,7 +8752,7 @@
           <p:cNvPr id="3" name="Content Placeholder 2">
             <a:extLst>
               <a:ext uri="{FF2B5EF4-FFF2-40B4-BE49-F238E27FC236}">
-                <a16:creationId xmlns:a16="http://schemas.microsoft.com/office/drawing/2014/main" xmlns="" id="{39EED756-37A5-4FB5-B271-BB7C39F2B5A0}"/>
+                <a16:creationId xmlns="" xmlns:a16="http://schemas.microsoft.com/office/drawing/2014/main" id="{39EED756-37A5-4FB5-B271-BB7C39F2B5A0}"/>
               </a:ext>
             </a:extLst>
           </p:cNvPr>
@@ -8870,11 +8840,11 @@
   <p:clrMapOvr>
     <a:masterClrMapping/>
   </p:clrMapOvr>
-  <mc:AlternateContent xmlns:mc="http://schemas.openxmlformats.org/markup-compatibility/2006">
-    <mc:Choice xmlns:p14="http://schemas.microsoft.com/office/powerpoint/2010/main" Requires="p14">
+  <mc:AlternateContent xmlns:mc="http://schemas.openxmlformats.org/markup-compatibility/2006" xmlns:p14="http://schemas.microsoft.com/office/powerpoint/2010/main">
+    <mc:Choice Requires="p14">
       <p:transition spd="slow" p14:dur="2000"/>
     </mc:Choice>
-    <mc:Fallback>
+    <mc:Fallback xmlns="">
       <p:transition spd="slow"/>
     </mc:Fallback>
   </mc:AlternateContent>
@@ -8910,7 +8880,7 @@
           <p:cNvPr id="2" name="Title 1">
             <a:extLst>
               <a:ext uri="{FF2B5EF4-FFF2-40B4-BE49-F238E27FC236}">
-                <a16:creationId xmlns:a16="http://schemas.microsoft.com/office/drawing/2014/main" xmlns="" id="{68DA8020-99A4-463C-8C97-D51395EDEFD5}"/>
+                <a16:creationId xmlns="" xmlns:a16="http://schemas.microsoft.com/office/drawing/2014/main" id="{68DA8020-99A4-463C-8C97-D51395EDEFD5}"/>
               </a:ext>
             </a:extLst>
           </p:cNvPr>
@@ -9445,8 +9415,8 @@
             </p:nvSpPr>
             <p:spPr>
               <a:xfrm>
-                <a:off x="1852960" y="4193977"/>
-                <a:ext cx="5462239" cy="1569660"/>
+                <a:off x="990600" y="4193977"/>
+                <a:ext cx="6781800" cy="1569660"/>
               </a:xfrm>
               <a:prstGeom prst="rect">
                 <a:avLst/>
@@ -9560,7 +9530,7 @@
                         <a:rPr lang="en-US" i="1">
                           <a:latin typeface="Cambria Math" charset="0"/>
                         </a:rPr>
-                        <m:t>=100 </m:t>
+                        <m:t>=10000 </m:t>
                       </m:r>
                       <m:r>
                         <a:rPr lang="en-US" i="1">
@@ -9694,8 +9664,8 @@
             </p:nvSpPr>
             <p:spPr>
               <a:xfrm>
-                <a:off x="1852960" y="4193977"/>
-                <a:ext cx="5462239" cy="1569660"/>
+                <a:off x="990600" y="4193977"/>
+                <a:ext cx="6781800" cy="1569660"/>
               </a:xfrm>
               <a:prstGeom prst="rect">
                 <a:avLst/>
@@ -9762,11 +9732,11 @@
   <p:clrMapOvr>
     <a:masterClrMapping/>
   </p:clrMapOvr>
-  <mc:AlternateContent xmlns:mc="http://schemas.openxmlformats.org/markup-compatibility/2006">
-    <mc:Choice xmlns:p14="http://schemas.microsoft.com/office/powerpoint/2010/main" Requires="p14">
+  <mc:AlternateContent xmlns:mc="http://schemas.openxmlformats.org/markup-compatibility/2006" xmlns:p14="http://schemas.microsoft.com/office/powerpoint/2010/main">
+    <mc:Choice Requires="p14">
       <p:transition spd="slow" p14:dur="2000"/>
     </mc:Choice>
-    <mc:Fallback>
+    <mc:Fallback xmlns="">
       <p:transition spd="slow"/>
     </mc:Fallback>
   </mc:AlternateContent>
@@ -9802,7 +9772,7 @@
           <p:cNvPr id="2" name="Title 1">
             <a:extLst>
               <a:ext uri="{FF2B5EF4-FFF2-40B4-BE49-F238E27FC236}">
-                <a16:creationId xmlns:a16="http://schemas.microsoft.com/office/drawing/2014/main" xmlns="" id="{F3E5901B-5854-4AFF-A199-0918CFB41A0A}"/>
+                <a16:creationId xmlns="" xmlns:a16="http://schemas.microsoft.com/office/drawing/2014/main" id="{F3E5901B-5854-4AFF-A199-0918CFB41A0A}"/>
               </a:ext>
             </a:extLst>
           </p:cNvPr>
@@ -10202,11 +10172,11 @@
   <p:clrMapOvr>
     <a:masterClrMapping/>
   </p:clrMapOvr>
-  <mc:AlternateContent xmlns:mc="http://schemas.openxmlformats.org/markup-compatibility/2006">
-    <mc:Choice xmlns:p14="http://schemas.microsoft.com/office/powerpoint/2010/main" Requires="p14">
+  <mc:AlternateContent xmlns:mc="http://schemas.openxmlformats.org/markup-compatibility/2006" xmlns:p14="http://schemas.microsoft.com/office/powerpoint/2010/main">
+    <mc:Choice Requires="p14">
       <p:transition spd="slow" p14:dur="2000"/>
     </mc:Choice>
-    <mc:Fallback>
+    <mc:Fallback xmlns="">
       <p:transition spd="slow"/>
     </mc:Fallback>
   </mc:AlternateContent>

</xml_diff>